<commit_message>
update figure with multiple fitted OCVs, graphite OCV uses 9 RK params instead of 7
</commit_message>
<xml_diff>
--- a/Figure4.pptx
+++ b/Figure4.pptx
@@ -243,7 +243,7 @@
           <a:p>
             <a:fld id="{84F06BC3-AC4E-C144-9E2A-DE6928941DE5}" type="datetimeFigureOut">
               <a:rPr lang="en-US" smtClean="0"/>
-              <a:t>5/23/23</a:t>
+              <a:t>11/1/23</a:t>
             </a:fld>
             <a:endParaRPr lang="en-US"/>
           </a:p>
@@ -413,7 +413,7 @@
           <a:p>
             <a:fld id="{84F06BC3-AC4E-C144-9E2A-DE6928941DE5}" type="datetimeFigureOut">
               <a:rPr lang="en-US" smtClean="0"/>
-              <a:t>5/23/23</a:t>
+              <a:t>11/1/23</a:t>
             </a:fld>
             <a:endParaRPr lang="en-US"/>
           </a:p>
@@ -593,7 +593,7 @@
           <a:p>
             <a:fld id="{84F06BC3-AC4E-C144-9E2A-DE6928941DE5}" type="datetimeFigureOut">
               <a:rPr lang="en-US" smtClean="0"/>
-              <a:t>5/23/23</a:t>
+              <a:t>11/1/23</a:t>
             </a:fld>
             <a:endParaRPr lang="en-US"/>
           </a:p>
@@ -763,7 +763,7 @@
           <a:p>
             <a:fld id="{84F06BC3-AC4E-C144-9E2A-DE6928941DE5}" type="datetimeFigureOut">
               <a:rPr lang="en-US" smtClean="0"/>
-              <a:t>5/23/23</a:t>
+              <a:t>11/1/23</a:t>
             </a:fld>
             <a:endParaRPr lang="en-US"/>
           </a:p>
@@ -1007,7 +1007,7 @@
           <a:p>
             <a:fld id="{84F06BC3-AC4E-C144-9E2A-DE6928941DE5}" type="datetimeFigureOut">
               <a:rPr lang="en-US" smtClean="0"/>
-              <a:t>5/23/23</a:t>
+              <a:t>11/1/23</a:t>
             </a:fld>
             <a:endParaRPr lang="en-US"/>
           </a:p>
@@ -1239,7 +1239,7 @@
           <a:p>
             <a:fld id="{84F06BC3-AC4E-C144-9E2A-DE6928941DE5}" type="datetimeFigureOut">
               <a:rPr lang="en-US" smtClean="0"/>
-              <a:t>5/23/23</a:t>
+              <a:t>11/1/23</a:t>
             </a:fld>
             <a:endParaRPr lang="en-US"/>
           </a:p>
@@ -1606,7 +1606,7 @@
           <a:p>
             <a:fld id="{84F06BC3-AC4E-C144-9E2A-DE6928941DE5}" type="datetimeFigureOut">
               <a:rPr lang="en-US" smtClean="0"/>
-              <a:t>5/23/23</a:t>
+              <a:t>11/1/23</a:t>
             </a:fld>
             <a:endParaRPr lang="en-US"/>
           </a:p>
@@ -1724,7 +1724,7 @@
           <a:p>
             <a:fld id="{84F06BC3-AC4E-C144-9E2A-DE6928941DE5}" type="datetimeFigureOut">
               <a:rPr lang="en-US" smtClean="0"/>
-              <a:t>5/23/23</a:t>
+              <a:t>11/1/23</a:t>
             </a:fld>
             <a:endParaRPr lang="en-US"/>
           </a:p>
@@ -1819,7 +1819,7 @@
           <a:p>
             <a:fld id="{84F06BC3-AC4E-C144-9E2A-DE6928941DE5}" type="datetimeFigureOut">
               <a:rPr lang="en-US" smtClean="0"/>
-              <a:t>5/23/23</a:t>
+              <a:t>11/1/23</a:t>
             </a:fld>
             <a:endParaRPr lang="en-US"/>
           </a:p>
@@ -2096,7 +2096,7 @@
           <a:p>
             <a:fld id="{84F06BC3-AC4E-C144-9E2A-DE6928941DE5}" type="datetimeFigureOut">
               <a:rPr lang="en-US" smtClean="0"/>
-              <a:t>5/23/23</a:t>
+              <a:t>11/1/23</a:t>
             </a:fld>
             <a:endParaRPr lang="en-US"/>
           </a:p>
@@ -2353,7 +2353,7 @@
           <a:p>
             <a:fld id="{84F06BC3-AC4E-C144-9E2A-DE6928941DE5}" type="datetimeFigureOut">
               <a:rPr lang="en-US" smtClean="0"/>
-              <a:t>5/23/23</a:t>
+              <a:t>11/1/23</a:t>
             </a:fld>
             <a:endParaRPr lang="en-US"/>
           </a:p>
@@ -2566,7 +2566,7 @@
           <a:p>
             <a:fld id="{84F06BC3-AC4E-C144-9E2A-DE6928941DE5}" type="datetimeFigureOut">
               <a:rPr lang="en-US" smtClean="0"/>
-              <a:t>5/23/23</a:t>
+              <a:t>11/1/23</a:t>
             </a:fld>
             <a:endParaRPr lang="en-US"/>
           </a:p>
@@ -2973,10 +2973,10 @@
       </p:grpSpPr>
       <p:pic>
         <p:nvPicPr>
-          <p:cNvPr id="7" name="Picture 6" descr="A picture containing text, diagram, plan, line&#10;&#10;Description automatically generated">
+          <p:cNvPr id="3" name="Picture 2" descr="A graph of a graph of a number of numbers&#10;&#10;Description automatically generated with medium confidence">
             <a:extLst>
               <a:ext uri="{FF2B5EF4-FFF2-40B4-BE49-F238E27FC236}">
-                <a16:creationId xmlns:a16="http://schemas.microsoft.com/office/drawing/2014/main" id="{8EBD88D1-AE7B-1828-CAB0-DD3638F980BE}"/>
+                <a16:creationId xmlns:a16="http://schemas.microsoft.com/office/drawing/2014/main" id="{35FC1AB4-DA16-AD00-2F8E-27444AB6D052}"/>
               </a:ext>
             </a:extLst>
           </p:cNvPr>
@@ -2993,7 +2993,7 @@
         </p:blipFill>
         <p:spPr>
           <a:xfrm>
-            <a:off x="16619" y="0"/>
+            <a:off x="-2561" y="0"/>
             <a:ext cx="7725266" cy="10058400"/>
           </a:xfrm>
           <a:prstGeom prst="rect">

</xml_diff>

<commit_message>
convert into pdf figure
</commit_message>
<xml_diff>
--- a/Figure4.pptx
+++ b/Figure4.pptx
@@ -243,7 +243,7 @@
           <a:p>
             <a:fld id="{84F06BC3-AC4E-C144-9E2A-DE6928941DE5}" type="datetimeFigureOut">
               <a:rPr lang="en-US" smtClean="0"/>
-              <a:t>11/1/23</a:t>
+              <a:t>12/15/23</a:t>
             </a:fld>
             <a:endParaRPr lang="en-US"/>
           </a:p>
@@ -413,7 +413,7 @@
           <a:p>
             <a:fld id="{84F06BC3-AC4E-C144-9E2A-DE6928941DE5}" type="datetimeFigureOut">
               <a:rPr lang="en-US" smtClean="0"/>
-              <a:t>11/1/23</a:t>
+              <a:t>12/15/23</a:t>
             </a:fld>
             <a:endParaRPr lang="en-US"/>
           </a:p>
@@ -593,7 +593,7 @@
           <a:p>
             <a:fld id="{84F06BC3-AC4E-C144-9E2A-DE6928941DE5}" type="datetimeFigureOut">
               <a:rPr lang="en-US" smtClean="0"/>
-              <a:t>11/1/23</a:t>
+              <a:t>12/15/23</a:t>
             </a:fld>
             <a:endParaRPr lang="en-US"/>
           </a:p>
@@ -763,7 +763,7 @@
           <a:p>
             <a:fld id="{84F06BC3-AC4E-C144-9E2A-DE6928941DE5}" type="datetimeFigureOut">
               <a:rPr lang="en-US" smtClean="0"/>
-              <a:t>11/1/23</a:t>
+              <a:t>12/15/23</a:t>
             </a:fld>
             <a:endParaRPr lang="en-US"/>
           </a:p>
@@ -1007,7 +1007,7 @@
           <a:p>
             <a:fld id="{84F06BC3-AC4E-C144-9E2A-DE6928941DE5}" type="datetimeFigureOut">
               <a:rPr lang="en-US" smtClean="0"/>
-              <a:t>11/1/23</a:t>
+              <a:t>12/15/23</a:t>
             </a:fld>
             <a:endParaRPr lang="en-US"/>
           </a:p>
@@ -1239,7 +1239,7 @@
           <a:p>
             <a:fld id="{84F06BC3-AC4E-C144-9E2A-DE6928941DE5}" type="datetimeFigureOut">
               <a:rPr lang="en-US" smtClean="0"/>
-              <a:t>11/1/23</a:t>
+              <a:t>12/15/23</a:t>
             </a:fld>
             <a:endParaRPr lang="en-US"/>
           </a:p>
@@ -1606,7 +1606,7 @@
           <a:p>
             <a:fld id="{84F06BC3-AC4E-C144-9E2A-DE6928941DE5}" type="datetimeFigureOut">
               <a:rPr lang="en-US" smtClean="0"/>
-              <a:t>11/1/23</a:t>
+              <a:t>12/15/23</a:t>
             </a:fld>
             <a:endParaRPr lang="en-US"/>
           </a:p>
@@ -1724,7 +1724,7 @@
           <a:p>
             <a:fld id="{84F06BC3-AC4E-C144-9E2A-DE6928941DE5}" type="datetimeFigureOut">
               <a:rPr lang="en-US" smtClean="0"/>
-              <a:t>11/1/23</a:t>
+              <a:t>12/15/23</a:t>
             </a:fld>
             <a:endParaRPr lang="en-US"/>
           </a:p>
@@ -1819,7 +1819,7 @@
           <a:p>
             <a:fld id="{84F06BC3-AC4E-C144-9E2A-DE6928941DE5}" type="datetimeFigureOut">
               <a:rPr lang="en-US" smtClean="0"/>
-              <a:t>11/1/23</a:t>
+              <a:t>12/15/23</a:t>
             </a:fld>
             <a:endParaRPr lang="en-US"/>
           </a:p>
@@ -2096,7 +2096,7 @@
           <a:p>
             <a:fld id="{84F06BC3-AC4E-C144-9E2A-DE6928941DE5}" type="datetimeFigureOut">
               <a:rPr lang="en-US" smtClean="0"/>
-              <a:t>11/1/23</a:t>
+              <a:t>12/15/23</a:t>
             </a:fld>
             <a:endParaRPr lang="en-US"/>
           </a:p>
@@ -2353,7 +2353,7 @@
           <a:p>
             <a:fld id="{84F06BC3-AC4E-C144-9E2A-DE6928941DE5}" type="datetimeFigureOut">
               <a:rPr lang="en-US" smtClean="0"/>
-              <a:t>11/1/23</a:t>
+              <a:t>12/15/23</a:t>
             </a:fld>
             <a:endParaRPr lang="en-US"/>
           </a:p>
@@ -2566,7 +2566,7 @@
           <a:p>
             <a:fld id="{84F06BC3-AC4E-C144-9E2A-DE6928941DE5}" type="datetimeFigureOut">
               <a:rPr lang="en-US" smtClean="0"/>
-              <a:t>11/1/23</a:t>
+              <a:t>12/15/23</a:t>
             </a:fld>
             <a:endParaRPr lang="en-US"/>
           </a:p>
@@ -2973,10 +2973,10 @@
       </p:grpSpPr>
       <p:pic>
         <p:nvPicPr>
-          <p:cNvPr id="3" name="Picture 2" descr="A graph of a graph of a number of numbers&#10;&#10;Description automatically generated with medium confidence">
+          <p:cNvPr id="4" name="Picture 3" descr="A collage of graphs&#10;&#10;Description automatically generated">
             <a:extLst>
               <a:ext uri="{FF2B5EF4-FFF2-40B4-BE49-F238E27FC236}">
-                <a16:creationId xmlns:a16="http://schemas.microsoft.com/office/drawing/2014/main" id="{35FC1AB4-DA16-AD00-2F8E-27444AB6D052}"/>
+                <a16:creationId xmlns:a16="http://schemas.microsoft.com/office/drawing/2014/main" id="{5BADE763-AA47-C8B8-88AA-CC3A17D7B1EE}"/>
               </a:ext>
             </a:extLst>
           </p:cNvPr>
@@ -2993,7 +2993,7 @@
         </p:blipFill>
         <p:spPr>
           <a:xfrm>
-            <a:off x="-2561" y="0"/>
+            <a:off x="25154" y="63705"/>
             <a:ext cx="7725266" cy="10058400"/>
           </a:xfrm>
           <a:prstGeom prst="rect">
@@ -3015,7 +3015,7 @@
         </p:nvSpPr>
         <p:spPr>
           <a:xfrm>
-            <a:off x="392714" y="100081"/>
+            <a:off x="25154" y="0"/>
             <a:ext cx="436338" cy="338554"/>
           </a:xfrm>
           <a:prstGeom prst="rect">
@@ -3053,7 +3053,7 @@
         </p:nvSpPr>
         <p:spPr>
           <a:xfrm>
-            <a:off x="2942809" y="100081"/>
+            <a:off x="2575249" y="0"/>
             <a:ext cx="436338" cy="338554"/>
           </a:xfrm>
           <a:prstGeom prst="rect">
@@ -3091,7 +3091,7 @@
         </p:nvSpPr>
         <p:spPr>
           <a:xfrm>
-            <a:off x="5492904" y="100081"/>
+            <a:off x="5125344" y="0"/>
             <a:ext cx="436338" cy="338554"/>
           </a:xfrm>
           <a:prstGeom prst="rect">
@@ -3129,7 +3129,7 @@
         </p:nvSpPr>
         <p:spPr>
           <a:xfrm>
-            <a:off x="392714" y="2629770"/>
+            <a:off x="25154" y="2529689"/>
             <a:ext cx="436338" cy="338554"/>
           </a:xfrm>
           <a:prstGeom prst="rect">
@@ -3167,7 +3167,7 @@
         </p:nvSpPr>
         <p:spPr>
           <a:xfrm>
-            <a:off x="2942809" y="2629770"/>
+            <a:off x="2575249" y="2529689"/>
             <a:ext cx="436338" cy="338554"/>
           </a:xfrm>
           <a:prstGeom prst="rect">
@@ -3205,7 +3205,7 @@
         </p:nvSpPr>
         <p:spPr>
           <a:xfrm>
-            <a:off x="5492904" y="2629770"/>
+            <a:off x="5125344" y="2529689"/>
             <a:ext cx="380232" cy="338554"/>
           </a:xfrm>
           <a:prstGeom prst="rect">
@@ -3243,7 +3243,7 @@
         </p:nvSpPr>
         <p:spPr>
           <a:xfrm>
-            <a:off x="392714" y="5098499"/>
+            <a:off x="25154" y="4998418"/>
             <a:ext cx="436338" cy="338554"/>
           </a:xfrm>
           <a:prstGeom prst="rect">
@@ -3281,7 +3281,7 @@
         </p:nvSpPr>
         <p:spPr>
           <a:xfrm>
-            <a:off x="2942809" y="5098499"/>
+            <a:off x="2575249" y="4998418"/>
             <a:ext cx="436338" cy="338554"/>
           </a:xfrm>
           <a:prstGeom prst="rect">
@@ -3319,7 +3319,7 @@
         </p:nvSpPr>
         <p:spPr>
           <a:xfrm>
-            <a:off x="5492904" y="5098499"/>
+            <a:off x="5125344" y="4998418"/>
             <a:ext cx="367408" cy="338554"/>
           </a:xfrm>
           <a:prstGeom prst="rect">
@@ -3371,7 +3371,7 @@
         </p:nvSpPr>
         <p:spPr>
           <a:xfrm>
-            <a:off x="392714" y="7610047"/>
+            <a:off x="25154" y="7509966"/>
             <a:ext cx="367408" cy="338554"/>
           </a:xfrm>
           <a:prstGeom prst="rect">
@@ -3409,7 +3409,7 @@
         </p:nvSpPr>
         <p:spPr>
           <a:xfrm>
-            <a:off x="2942809" y="7610047"/>
+            <a:off x="2575249" y="7509966"/>
             <a:ext cx="425116" cy="338554"/>
           </a:xfrm>
           <a:prstGeom prst="rect">
@@ -3447,7 +3447,7 @@
         </p:nvSpPr>
         <p:spPr>
           <a:xfrm>
-            <a:off x="5492904" y="7610047"/>
+            <a:off x="5125344" y="7509966"/>
             <a:ext cx="367408" cy="338554"/>
           </a:xfrm>
           <a:prstGeom prst="rect">

</xml_diff>